<commit_message>
L weighting lecture update
</commit_message>
<xml_diff>
--- a/References/L weighting.pptx
+++ b/References/L weighting.pptx
@@ -7,11 +7,12 @@
   <p:sldIdLst>
     <p:sldId id="256" r:id="rId2"/>
     <p:sldId id="262" r:id="rId3"/>
-    <p:sldId id="261" r:id="rId4"/>
-    <p:sldId id="257" r:id="rId5"/>
-    <p:sldId id="258" r:id="rId6"/>
-    <p:sldId id="259" r:id="rId7"/>
-    <p:sldId id="260" r:id="rId8"/>
+    <p:sldId id="263" r:id="rId4"/>
+    <p:sldId id="261" r:id="rId5"/>
+    <p:sldId id="257" r:id="rId6"/>
+    <p:sldId id="258" r:id="rId7"/>
+    <p:sldId id="259" r:id="rId8"/>
+    <p:sldId id="260" r:id="rId9"/>
   </p:sldIdLst>
   <p:sldSz cx="12192000" cy="6858000"/>
   <p:notesSz cx="6858000" cy="9144000"/>
@@ -276,7 +277,7 @@
           <a:p>
             <a:fld id="{34E6040C-435D-4AF4-9564-FA01DC48BCC2}" type="datetimeFigureOut">
               <a:rPr lang="en-US" smtClean="0"/>
-              <a:t>2/14/2021</a:t>
+              <a:t>3/2/2021</a:t>
             </a:fld>
             <a:endParaRPr lang="en-US"/>
           </a:p>
@@ -474,7 +475,7 @@
           <a:p>
             <a:fld id="{34E6040C-435D-4AF4-9564-FA01DC48BCC2}" type="datetimeFigureOut">
               <a:rPr lang="en-US" smtClean="0"/>
-              <a:t>2/14/2021</a:t>
+              <a:t>3/2/2021</a:t>
             </a:fld>
             <a:endParaRPr lang="en-US"/>
           </a:p>
@@ -682,7 +683,7 @@
           <a:p>
             <a:fld id="{34E6040C-435D-4AF4-9564-FA01DC48BCC2}" type="datetimeFigureOut">
               <a:rPr lang="en-US" smtClean="0"/>
-              <a:t>2/14/2021</a:t>
+              <a:t>3/2/2021</a:t>
             </a:fld>
             <a:endParaRPr lang="en-US"/>
           </a:p>
@@ -880,7 +881,7 @@
           <a:p>
             <a:fld id="{34E6040C-435D-4AF4-9564-FA01DC48BCC2}" type="datetimeFigureOut">
               <a:rPr lang="en-US" smtClean="0"/>
-              <a:t>2/14/2021</a:t>
+              <a:t>3/2/2021</a:t>
             </a:fld>
             <a:endParaRPr lang="en-US"/>
           </a:p>
@@ -1155,7 +1156,7 @@
           <a:p>
             <a:fld id="{34E6040C-435D-4AF4-9564-FA01DC48BCC2}" type="datetimeFigureOut">
               <a:rPr lang="en-US" smtClean="0"/>
-              <a:t>2/14/2021</a:t>
+              <a:t>3/2/2021</a:t>
             </a:fld>
             <a:endParaRPr lang="en-US"/>
           </a:p>
@@ -1420,7 +1421,7 @@
           <a:p>
             <a:fld id="{34E6040C-435D-4AF4-9564-FA01DC48BCC2}" type="datetimeFigureOut">
               <a:rPr lang="en-US" smtClean="0"/>
-              <a:t>2/14/2021</a:t>
+              <a:t>3/2/2021</a:t>
             </a:fld>
             <a:endParaRPr lang="en-US"/>
           </a:p>
@@ -1832,7 +1833,7 @@
           <a:p>
             <a:fld id="{34E6040C-435D-4AF4-9564-FA01DC48BCC2}" type="datetimeFigureOut">
               <a:rPr lang="en-US" smtClean="0"/>
-              <a:t>2/14/2021</a:t>
+              <a:t>3/2/2021</a:t>
             </a:fld>
             <a:endParaRPr lang="en-US"/>
           </a:p>
@@ -1973,7 +1974,7 @@
           <a:p>
             <a:fld id="{34E6040C-435D-4AF4-9564-FA01DC48BCC2}" type="datetimeFigureOut">
               <a:rPr lang="en-US" smtClean="0"/>
-              <a:t>2/14/2021</a:t>
+              <a:t>3/2/2021</a:t>
             </a:fld>
             <a:endParaRPr lang="en-US"/>
           </a:p>
@@ -2086,7 +2087,7 @@
           <a:p>
             <a:fld id="{34E6040C-435D-4AF4-9564-FA01DC48BCC2}" type="datetimeFigureOut">
               <a:rPr lang="en-US" smtClean="0"/>
-              <a:t>2/14/2021</a:t>
+              <a:t>3/2/2021</a:t>
             </a:fld>
             <a:endParaRPr lang="en-US"/>
           </a:p>
@@ -2397,7 +2398,7 @@
           <a:p>
             <a:fld id="{34E6040C-435D-4AF4-9564-FA01DC48BCC2}" type="datetimeFigureOut">
               <a:rPr lang="en-US" smtClean="0"/>
-              <a:t>2/14/2021</a:t>
+              <a:t>3/2/2021</a:t>
             </a:fld>
             <a:endParaRPr lang="en-US"/>
           </a:p>
@@ -2685,7 +2686,7 @@
           <a:p>
             <a:fld id="{34E6040C-435D-4AF4-9564-FA01DC48BCC2}" type="datetimeFigureOut">
               <a:rPr lang="en-US" smtClean="0"/>
-              <a:t>2/14/2021</a:t>
+              <a:t>3/2/2021</a:t>
             </a:fld>
             <a:endParaRPr lang="en-US"/>
           </a:p>
@@ -2926,7 +2927,7 @@
           <a:p>
             <a:fld id="{34E6040C-435D-4AF4-9564-FA01DC48BCC2}" type="datetimeFigureOut">
               <a:rPr lang="en-US" smtClean="0"/>
-              <a:t>2/14/2021</a:t>
+              <a:t>3/2/2021</a:t>
             </a:fld>
             <a:endParaRPr lang="en-US"/>
           </a:p>
@@ -3619,464 +3620,6 @@
       </p:grpSpPr>
       <p:sp>
         <p:nvSpPr>
-          <p:cNvPr id="2" name="Title 1">
-            <a:extLst>
-              <a:ext uri="{FF2B5EF4-FFF2-40B4-BE49-F238E27FC236}">
-                <a16:creationId xmlns:a16="http://schemas.microsoft.com/office/drawing/2014/main" id="{BE79841B-49DF-4DD4-B002-2AEA8601D73C}"/>
-              </a:ext>
-            </a:extLst>
-          </p:cNvPr>
-          <p:cNvSpPr>
-            <a:spLocks noGrp="1"/>
-          </p:cNvSpPr>
-          <p:nvPr>
-            <p:ph type="ctrTitle"/>
-          </p:nvPr>
-        </p:nvSpPr>
-        <p:spPr>
-          <a:xfrm>
-            <a:off x="1054190" y="3123250"/>
-            <a:ext cx="1037665" cy="617081"/>
-          </a:xfrm>
-          <a:ln>
-            <a:solidFill>
-              <a:schemeClr val="accent1"/>
-            </a:solidFill>
-          </a:ln>
-        </p:spPr>
-        <p:txBody>
-          <a:bodyPr>
-            <a:noAutofit/>
-          </a:bodyPr>
-          <a:lstStyle/>
-          <a:p>
-            <a:r>
-              <a:rPr lang="en-US" sz="2000" dirty="0"/>
-              <a:t>Current</a:t>
-            </a:r>
-            <a:br>
-              <a:rPr lang="en-US" sz="2000" dirty="0"/>
-            </a:br>
-            <a:r>
-              <a:rPr lang="en-US" sz="2000" dirty="0"/>
-              <a:t>Reality</a:t>
-            </a:r>
-          </a:p>
-        </p:txBody>
-      </p:sp>
-      <p:sp>
-        <p:nvSpPr>
-          <p:cNvPr id="4" name="Title 1">
-            <a:extLst>
-              <a:ext uri="{FF2B5EF4-FFF2-40B4-BE49-F238E27FC236}">
-                <a16:creationId xmlns:a16="http://schemas.microsoft.com/office/drawing/2014/main" id="{16D37473-2237-4246-976A-05F0CF693631}"/>
-              </a:ext>
-            </a:extLst>
-          </p:cNvPr>
-          <p:cNvSpPr txBox="1">
-            <a:spLocks/>
-          </p:cNvSpPr>
-          <p:nvPr/>
-        </p:nvSpPr>
-        <p:spPr>
-          <a:xfrm>
-            <a:off x="2760625" y="3123572"/>
-            <a:ext cx="1410581" cy="617081"/>
-          </a:xfrm>
-          <a:prstGeom prst="rect">
-            <a:avLst/>
-          </a:prstGeom>
-          <a:ln>
-            <a:solidFill>
-              <a:schemeClr val="accent1"/>
-            </a:solidFill>
-          </a:ln>
-        </p:spPr>
-        <p:txBody>
-          <a:bodyPr vert="horz" lIns="91440" tIns="45720" rIns="91440" bIns="45720" rtlCol="0" anchor="b">
-            <a:noAutofit/>
-          </a:bodyPr>
-          <a:lstStyle>
-            <a:lvl1pPr algn="ctr" defTabSz="914400" rtl="0" eaLnBrk="1" latinLnBrk="0" hangingPunct="1">
-              <a:lnSpc>
-                <a:spcPct val="90000"/>
-              </a:lnSpc>
-              <a:spcBef>
-                <a:spcPct val="0"/>
-              </a:spcBef>
-              <a:buNone/>
-              <a:defRPr sz="6000" kern="1200">
-                <a:solidFill>
-                  <a:schemeClr val="tx1"/>
-                </a:solidFill>
-                <a:latin typeface="+mj-lt"/>
-                <a:ea typeface="+mj-ea"/>
-                <a:cs typeface="+mj-cs"/>
-              </a:defRPr>
-            </a:lvl1pPr>
-          </a:lstStyle>
-          <a:p>
-            <a:r>
-              <a:rPr lang="en-US" sz="2000" dirty="0"/>
-              <a:t>Conceptual Model</a:t>
-            </a:r>
-          </a:p>
-        </p:txBody>
-      </p:sp>
-      <p:sp>
-        <p:nvSpPr>
-          <p:cNvPr id="5" name="Title 1">
-            <a:extLst>
-              <a:ext uri="{FF2B5EF4-FFF2-40B4-BE49-F238E27FC236}">
-                <a16:creationId xmlns:a16="http://schemas.microsoft.com/office/drawing/2014/main" id="{30E6FA00-C89E-433B-9D90-AFBA12D18074}"/>
-              </a:ext>
-            </a:extLst>
-          </p:cNvPr>
-          <p:cNvSpPr txBox="1">
-            <a:spLocks/>
-          </p:cNvSpPr>
-          <p:nvPr/>
-        </p:nvSpPr>
-        <p:spPr>
-          <a:xfrm>
-            <a:off x="6683965" y="3249545"/>
-            <a:ext cx="1122219" cy="376518"/>
-          </a:xfrm>
-          <a:prstGeom prst="rect">
-            <a:avLst/>
-          </a:prstGeom>
-          <a:ln>
-            <a:solidFill>
-              <a:schemeClr val="accent1"/>
-            </a:solidFill>
-          </a:ln>
-        </p:spPr>
-        <p:txBody>
-          <a:bodyPr vert="horz" lIns="91440" tIns="45720" rIns="91440" bIns="45720" rtlCol="0" anchor="b">
-            <a:noAutofit/>
-          </a:bodyPr>
-          <a:lstStyle>
-            <a:lvl1pPr algn="ctr" defTabSz="914400" rtl="0" eaLnBrk="1" latinLnBrk="0" hangingPunct="1">
-              <a:lnSpc>
-                <a:spcPct val="90000"/>
-              </a:lnSpc>
-              <a:spcBef>
-                <a:spcPct val="0"/>
-              </a:spcBef>
-              <a:buNone/>
-              <a:defRPr sz="6000" kern="1200">
-                <a:solidFill>
-                  <a:schemeClr val="tx1"/>
-                </a:solidFill>
-                <a:latin typeface="+mj-lt"/>
-                <a:ea typeface="+mj-ea"/>
-                <a:cs typeface="+mj-cs"/>
-              </a:defRPr>
-            </a:lvl1pPr>
-          </a:lstStyle>
-          <a:p>
-            <a:r>
-              <a:rPr lang="en-US" sz="2000" dirty="0"/>
-              <a:t>Forecast</a:t>
-            </a:r>
-          </a:p>
-        </p:txBody>
-      </p:sp>
-      <p:cxnSp>
-        <p:nvCxnSpPr>
-          <p:cNvPr id="11" name="Straight Arrow Connector 10">
-            <a:extLst>
-              <a:ext uri="{FF2B5EF4-FFF2-40B4-BE49-F238E27FC236}">
-                <a16:creationId xmlns:a16="http://schemas.microsoft.com/office/drawing/2014/main" id="{8D238BF1-E17A-41D9-8252-7EFDB8329FDC}"/>
-              </a:ext>
-            </a:extLst>
-          </p:cNvPr>
-          <p:cNvCxnSpPr>
-            <a:cxnSpLocks/>
-            <a:stCxn id="2" idx="3"/>
-            <a:endCxn id="4" idx="1"/>
-          </p:cNvCxnSpPr>
-          <p:nvPr/>
-        </p:nvCxnSpPr>
-        <p:spPr>
-          <a:xfrm>
-            <a:off x="2091855" y="3431791"/>
-            <a:ext cx="668770" cy="322"/>
-          </a:xfrm>
-          <a:prstGeom prst="straightConnector1">
-            <a:avLst/>
-          </a:prstGeom>
-          <a:ln>
-            <a:tailEnd type="triangle"/>
-          </a:ln>
-        </p:spPr>
-        <p:style>
-          <a:lnRef idx="1">
-            <a:schemeClr val="accent1"/>
-          </a:lnRef>
-          <a:fillRef idx="0">
-            <a:schemeClr val="accent1"/>
-          </a:fillRef>
-          <a:effectRef idx="0">
-            <a:schemeClr val="accent1"/>
-          </a:effectRef>
-          <a:fontRef idx="minor">
-            <a:schemeClr val="tx1"/>
-          </a:fontRef>
-        </p:style>
-      </p:cxnSp>
-      <p:cxnSp>
-        <p:nvCxnSpPr>
-          <p:cNvPr id="12" name="Straight Arrow Connector 11">
-            <a:extLst>
-              <a:ext uri="{FF2B5EF4-FFF2-40B4-BE49-F238E27FC236}">
-                <a16:creationId xmlns:a16="http://schemas.microsoft.com/office/drawing/2014/main" id="{C4C90F58-5BC9-4B18-85C6-B6CEBB4DE611}"/>
-              </a:ext>
-            </a:extLst>
-          </p:cNvPr>
-          <p:cNvCxnSpPr>
-            <a:cxnSpLocks/>
-            <a:stCxn id="4" idx="3"/>
-          </p:cNvCxnSpPr>
-          <p:nvPr/>
-        </p:nvCxnSpPr>
-        <p:spPr>
-          <a:xfrm>
-            <a:off x="4171206" y="3432113"/>
-            <a:ext cx="456348" cy="0"/>
-          </a:xfrm>
-          <a:prstGeom prst="straightConnector1">
-            <a:avLst/>
-          </a:prstGeom>
-          <a:ln>
-            <a:tailEnd type="triangle"/>
-          </a:ln>
-        </p:spPr>
-        <p:style>
-          <a:lnRef idx="1">
-            <a:schemeClr val="accent1"/>
-          </a:lnRef>
-          <a:fillRef idx="0">
-            <a:schemeClr val="accent1"/>
-          </a:fillRef>
-          <a:effectRef idx="0">
-            <a:schemeClr val="accent1"/>
-          </a:effectRef>
-          <a:fontRef idx="minor">
-            <a:schemeClr val="tx1"/>
-          </a:fontRef>
-        </p:style>
-      </p:cxnSp>
-      <p:sp>
-        <p:nvSpPr>
-          <p:cNvPr id="29" name="Title 1">
-            <a:extLst>
-              <a:ext uri="{FF2B5EF4-FFF2-40B4-BE49-F238E27FC236}">
-                <a16:creationId xmlns:a16="http://schemas.microsoft.com/office/drawing/2014/main" id="{628B551D-EE43-47E4-B353-FE7BA28483D9}"/>
-              </a:ext>
-            </a:extLst>
-          </p:cNvPr>
-          <p:cNvSpPr txBox="1">
-            <a:spLocks/>
-          </p:cNvSpPr>
-          <p:nvPr/>
-        </p:nvSpPr>
-        <p:spPr>
-          <a:xfrm>
-            <a:off x="4621629" y="3117387"/>
-            <a:ext cx="1605989" cy="617081"/>
-          </a:xfrm>
-          <a:prstGeom prst="rect">
-            <a:avLst/>
-          </a:prstGeom>
-          <a:ln>
-            <a:solidFill>
-              <a:schemeClr val="accent1"/>
-            </a:solidFill>
-          </a:ln>
-        </p:spPr>
-        <p:txBody>
-          <a:bodyPr vert="horz" lIns="91440" tIns="45720" rIns="91440" bIns="45720" rtlCol="0" anchor="b">
-            <a:noAutofit/>
-          </a:bodyPr>
-          <a:lstStyle>
-            <a:lvl1pPr algn="ctr" defTabSz="914400" rtl="0" eaLnBrk="1" latinLnBrk="0" hangingPunct="1">
-              <a:lnSpc>
-                <a:spcPct val="90000"/>
-              </a:lnSpc>
-              <a:spcBef>
-                <a:spcPct val="0"/>
-              </a:spcBef>
-              <a:buNone/>
-              <a:defRPr sz="6000" kern="1200">
-                <a:solidFill>
-                  <a:schemeClr val="tx1"/>
-                </a:solidFill>
-                <a:latin typeface="+mj-lt"/>
-                <a:ea typeface="+mj-ea"/>
-                <a:cs typeface="+mj-cs"/>
-              </a:defRPr>
-            </a:lvl1pPr>
-          </a:lstStyle>
-          <a:p>
-            <a:r>
-              <a:rPr lang="en-US" sz="2000" dirty="0"/>
-              <a:t>Mathematical Model</a:t>
-            </a:r>
-          </a:p>
-        </p:txBody>
-      </p:sp>
-      <p:cxnSp>
-        <p:nvCxnSpPr>
-          <p:cNvPr id="30" name="Straight Arrow Connector 29">
-            <a:extLst>
-              <a:ext uri="{FF2B5EF4-FFF2-40B4-BE49-F238E27FC236}">
-                <a16:creationId xmlns:a16="http://schemas.microsoft.com/office/drawing/2014/main" id="{ECC8D4D9-BCE2-49D6-90C4-616AD81984F4}"/>
-              </a:ext>
-            </a:extLst>
-          </p:cNvPr>
-          <p:cNvCxnSpPr>
-            <a:cxnSpLocks/>
-          </p:cNvCxnSpPr>
-          <p:nvPr/>
-        </p:nvCxnSpPr>
-        <p:spPr>
-          <a:xfrm>
-            <a:off x="6227618" y="3430028"/>
-            <a:ext cx="456348" cy="0"/>
-          </a:xfrm>
-          <a:prstGeom prst="straightConnector1">
-            <a:avLst/>
-          </a:prstGeom>
-          <a:ln>
-            <a:tailEnd type="triangle"/>
-          </a:ln>
-        </p:spPr>
-        <p:style>
-          <a:lnRef idx="1">
-            <a:schemeClr val="accent1"/>
-          </a:lnRef>
-          <a:fillRef idx="0">
-            <a:schemeClr val="accent1"/>
-          </a:fillRef>
-          <a:effectRef idx="0">
-            <a:schemeClr val="accent1"/>
-          </a:effectRef>
-          <a:fontRef idx="minor">
-            <a:schemeClr val="tx1"/>
-          </a:fontRef>
-        </p:style>
-      </p:cxnSp>
-      <p:cxnSp>
-        <p:nvCxnSpPr>
-          <p:cNvPr id="56" name="Straight Arrow Connector 55">
-            <a:extLst>
-              <a:ext uri="{FF2B5EF4-FFF2-40B4-BE49-F238E27FC236}">
-                <a16:creationId xmlns:a16="http://schemas.microsoft.com/office/drawing/2014/main" id="{ABFF7445-C26E-48AE-831C-5C97DF6EBAD5}"/>
-              </a:ext>
-            </a:extLst>
-          </p:cNvPr>
-          <p:cNvCxnSpPr>
-            <a:cxnSpLocks/>
-          </p:cNvCxnSpPr>
-          <p:nvPr/>
-        </p:nvCxnSpPr>
-        <p:spPr>
-          <a:xfrm>
-            <a:off x="7806184" y="3431865"/>
-            <a:ext cx="776431" cy="0"/>
-          </a:xfrm>
-          <a:prstGeom prst="straightConnector1">
-            <a:avLst/>
-          </a:prstGeom>
-          <a:ln>
-            <a:tailEnd type="triangle"/>
-          </a:ln>
-        </p:spPr>
-        <p:style>
-          <a:lnRef idx="1">
-            <a:schemeClr val="accent1"/>
-          </a:lnRef>
-          <a:fillRef idx="0">
-            <a:schemeClr val="accent1"/>
-          </a:fillRef>
-          <a:effectRef idx="0">
-            <a:schemeClr val="accent1"/>
-          </a:effectRef>
-          <a:fontRef idx="minor">
-            <a:schemeClr val="tx1"/>
-          </a:fontRef>
-        </p:style>
-      </p:cxnSp>
-      <p:sp>
-        <p:nvSpPr>
-          <p:cNvPr id="57" name="Title 1">
-            <a:extLst>
-              <a:ext uri="{FF2B5EF4-FFF2-40B4-BE49-F238E27FC236}">
-                <a16:creationId xmlns:a16="http://schemas.microsoft.com/office/drawing/2014/main" id="{01A342A9-F893-4055-9C31-D086183E8748}"/>
-              </a:ext>
-            </a:extLst>
-          </p:cNvPr>
-          <p:cNvSpPr txBox="1">
-            <a:spLocks/>
-          </p:cNvSpPr>
-          <p:nvPr/>
-        </p:nvSpPr>
-        <p:spPr>
-          <a:xfrm>
-            <a:off x="8582615" y="3105758"/>
-            <a:ext cx="1037665" cy="617081"/>
-          </a:xfrm>
-          <a:prstGeom prst="rect">
-            <a:avLst/>
-          </a:prstGeom>
-          <a:ln>
-            <a:solidFill>
-              <a:srgbClr val="FF0000"/>
-            </a:solidFill>
-            <a:prstDash val="solid"/>
-          </a:ln>
-        </p:spPr>
-        <p:txBody>
-          <a:bodyPr vert="horz" lIns="91440" tIns="45720" rIns="91440" bIns="45720" rtlCol="0" anchor="b">
-            <a:noAutofit/>
-          </a:bodyPr>
-          <a:lstStyle>
-            <a:lvl1pPr algn="ctr" defTabSz="914400" rtl="0" eaLnBrk="1" latinLnBrk="0" hangingPunct="1">
-              <a:lnSpc>
-                <a:spcPct val="90000"/>
-              </a:lnSpc>
-              <a:spcBef>
-                <a:spcPct val="0"/>
-              </a:spcBef>
-              <a:buNone/>
-              <a:defRPr sz="6000" kern="1200">
-                <a:solidFill>
-                  <a:schemeClr val="tx1"/>
-                </a:solidFill>
-                <a:latin typeface="+mj-lt"/>
-                <a:ea typeface="+mj-ea"/>
-                <a:cs typeface="+mj-cs"/>
-              </a:defRPr>
-            </a:lvl1pPr>
-          </a:lstStyle>
-          <a:p>
-            <a:r>
-              <a:rPr lang="en-US" sz="2000" dirty="0"/>
-              <a:t>Future</a:t>
-            </a:r>
-            <a:br>
-              <a:rPr lang="en-US" sz="2000" dirty="0"/>
-            </a:br>
-            <a:r>
-              <a:rPr lang="en-US" sz="2000" dirty="0"/>
-              <a:t>Reality</a:t>
-            </a:r>
-          </a:p>
-        </p:txBody>
-      </p:sp>
-      <p:sp>
-        <p:nvSpPr>
           <p:cNvPr id="13" name="Title 1">
             <a:extLst>
               <a:ext uri="{FF2B5EF4-FFF2-40B4-BE49-F238E27FC236}">
@@ -4148,7 +3691,7 @@
         </p:nvSpPr>
         <p:spPr>
           <a:xfrm>
-            <a:off x="829916" y="6299355"/>
+            <a:off x="829916" y="2677381"/>
             <a:ext cx="10532168" cy="376518"/>
           </a:xfrm>
           <a:prstGeom prst="rect">
@@ -4183,8 +3726,65 @@
           </a:lstStyle>
           <a:p>
             <a:r>
+              <a:rPr lang="en-US" sz="2400" dirty="0"/>
+              <a:t>A scientific model is a mathematical (usually) representation of processes that translate conditions on the boundary and due to internal perturbations into internal states given the spatial distribution of relevant parameters within the domain.</a:t>
+            </a:r>
+          </a:p>
+        </p:txBody>
+      </p:sp>
+      <p:sp>
+        <p:nvSpPr>
+          <p:cNvPr id="15" name="Title 1">
+            <a:extLst>
+              <a:ext uri="{FF2B5EF4-FFF2-40B4-BE49-F238E27FC236}">
+                <a16:creationId xmlns:a16="http://schemas.microsoft.com/office/drawing/2014/main" id="{CABB4424-974B-481F-9967-8524AB6D0A16}"/>
+              </a:ext>
+            </a:extLst>
+          </p:cNvPr>
+          <p:cNvSpPr txBox="1">
+            <a:spLocks/>
+          </p:cNvSpPr>
+          <p:nvPr/>
+        </p:nvSpPr>
+        <p:spPr>
+          <a:xfrm>
+            <a:off x="829916" y="6299355"/>
+            <a:ext cx="10532168" cy="376518"/>
+          </a:xfrm>
+          <a:prstGeom prst="rect">
+            <a:avLst/>
+          </a:prstGeom>
+          <a:ln>
+            <a:noFill/>
+          </a:ln>
+        </p:spPr>
+        <p:txBody>
+          <a:bodyPr vert="horz" lIns="91440" tIns="45720" rIns="91440" bIns="45720" rtlCol="0" anchor="ctr">
+            <a:noAutofit/>
+          </a:bodyPr>
+          <a:lstStyle>
+            <a:lvl1pPr algn="ctr" defTabSz="914400" rtl="0" eaLnBrk="1" latinLnBrk="0" hangingPunct="1">
+              <a:lnSpc>
+                <a:spcPct val="90000"/>
+              </a:lnSpc>
+              <a:spcBef>
+                <a:spcPct val="0"/>
+              </a:spcBef>
+              <a:buNone/>
+              <a:defRPr sz="6000" kern="1200">
+                <a:solidFill>
+                  <a:schemeClr val="tx1"/>
+                </a:solidFill>
+                <a:latin typeface="+mj-lt"/>
+                <a:ea typeface="+mj-ea"/>
+                <a:cs typeface="+mj-cs"/>
+              </a:defRPr>
+            </a:lvl1pPr>
+          </a:lstStyle>
+          <a:p>
+            <a:r>
               <a:rPr lang="en-US" sz="1600" dirty="0"/>
-              <a:t>* The choice of which forecasts are important should inform model construction. </a:t>
+              <a:t>* Catchy, right!  Extra credit for the first person to turn this into a jingle!</a:t>
             </a:r>
           </a:p>
         </p:txBody>
@@ -4192,7 +3792,7 @@
     </p:spTree>
     <p:extLst>
       <p:ext uri="{BB962C8B-B14F-4D97-AF65-F5344CB8AC3E}">
-        <p14:creationId xmlns:p14="http://schemas.microsoft.com/office/powerpoint/2010/main" val="2249100097"/>
+        <p14:creationId xmlns:p14="http://schemas.microsoft.com/office/powerpoint/2010/main" val="2856923904"/>
       </p:ext>
     </p:extLst>
   </p:cSld>
@@ -4341,7 +3941,7 @@
         </p:nvSpPr>
         <p:spPr>
           <a:xfrm>
-            <a:off x="6683965" y="3243607"/>
+            <a:off x="6683965" y="3249545"/>
             <a:ext cx="1122219" cy="376518"/>
           </a:xfrm>
           <a:prstGeom prst="rect">
@@ -4384,12 +3984,97 @@
           </a:p>
         </p:txBody>
       </p:sp>
-      <p:sp>
-        <p:nvSpPr>
-          <p:cNvPr id="6" name="Title 1">
-            <a:extLst>
-              <a:ext uri="{FF2B5EF4-FFF2-40B4-BE49-F238E27FC236}">
-                <a16:creationId xmlns:a16="http://schemas.microsoft.com/office/drawing/2014/main" id="{514515F5-5A38-48E9-8C54-F7AF5FF40C54}"/>
+      <p:cxnSp>
+        <p:nvCxnSpPr>
+          <p:cNvPr id="11" name="Straight Arrow Connector 10">
+            <a:extLst>
+              <a:ext uri="{FF2B5EF4-FFF2-40B4-BE49-F238E27FC236}">
+                <a16:creationId xmlns:a16="http://schemas.microsoft.com/office/drawing/2014/main" id="{8D238BF1-E17A-41D9-8252-7EFDB8329FDC}"/>
+              </a:ext>
+            </a:extLst>
+          </p:cNvPr>
+          <p:cNvCxnSpPr>
+            <a:cxnSpLocks/>
+            <a:stCxn id="2" idx="3"/>
+            <a:endCxn id="4" idx="1"/>
+          </p:cNvCxnSpPr>
+          <p:nvPr/>
+        </p:nvCxnSpPr>
+        <p:spPr>
+          <a:xfrm>
+            <a:off x="2091855" y="3431791"/>
+            <a:ext cx="668770" cy="322"/>
+          </a:xfrm>
+          <a:prstGeom prst="straightConnector1">
+            <a:avLst/>
+          </a:prstGeom>
+          <a:ln>
+            <a:tailEnd type="triangle"/>
+          </a:ln>
+        </p:spPr>
+        <p:style>
+          <a:lnRef idx="1">
+            <a:schemeClr val="accent1"/>
+          </a:lnRef>
+          <a:fillRef idx="0">
+            <a:schemeClr val="accent1"/>
+          </a:fillRef>
+          <a:effectRef idx="0">
+            <a:schemeClr val="accent1"/>
+          </a:effectRef>
+          <a:fontRef idx="minor">
+            <a:schemeClr val="tx1"/>
+          </a:fontRef>
+        </p:style>
+      </p:cxnSp>
+      <p:cxnSp>
+        <p:nvCxnSpPr>
+          <p:cNvPr id="12" name="Straight Arrow Connector 11">
+            <a:extLst>
+              <a:ext uri="{FF2B5EF4-FFF2-40B4-BE49-F238E27FC236}">
+                <a16:creationId xmlns:a16="http://schemas.microsoft.com/office/drawing/2014/main" id="{C4C90F58-5BC9-4B18-85C6-B6CEBB4DE611}"/>
+              </a:ext>
+            </a:extLst>
+          </p:cNvPr>
+          <p:cNvCxnSpPr>
+            <a:cxnSpLocks/>
+            <a:stCxn id="4" idx="3"/>
+          </p:cNvCxnSpPr>
+          <p:nvPr/>
+        </p:nvCxnSpPr>
+        <p:spPr>
+          <a:xfrm>
+            <a:off x="4171206" y="3432113"/>
+            <a:ext cx="456348" cy="0"/>
+          </a:xfrm>
+          <a:prstGeom prst="straightConnector1">
+            <a:avLst/>
+          </a:prstGeom>
+          <a:ln>
+            <a:tailEnd type="triangle"/>
+          </a:ln>
+        </p:spPr>
+        <p:style>
+          <a:lnRef idx="1">
+            <a:schemeClr val="accent1"/>
+          </a:lnRef>
+          <a:fillRef idx="0">
+            <a:schemeClr val="accent1"/>
+          </a:fillRef>
+          <a:effectRef idx="0">
+            <a:schemeClr val="accent1"/>
+          </a:effectRef>
+          <a:fontRef idx="minor">
+            <a:schemeClr val="tx1"/>
+          </a:fontRef>
+        </p:style>
+      </p:cxnSp>
+      <p:sp>
+        <p:nvSpPr>
+          <p:cNvPr id="29" name="Title 1">
+            <a:extLst>
+              <a:ext uri="{FF2B5EF4-FFF2-40B4-BE49-F238E27FC236}">
+                <a16:creationId xmlns:a16="http://schemas.microsoft.com/office/drawing/2014/main" id="{628B551D-EE43-47E4-B353-FE7BA28483D9}"/>
               </a:ext>
             </a:extLst>
           </p:cNvPr>
@@ -4400,8 +4085,8 @@
         </p:nvSpPr>
         <p:spPr>
           <a:xfrm>
-            <a:off x="6726241" y="2396737"/>
-            <a:ext cx="1037665" cy="376518"/>
+            <a:off x="4621629" y="3117387"/>
+            <a:ext cx="1605989" cy="617081"/>
           </a:xfrm>
           <a:prstGeom prst="rect">
             <a:avLst/>
@@ -4438,17 +4123,99 @@
           <a:p>
             <a:r>
               <a:rPr lang="en-US" sz="2000" dirty="0"/>
-              <a:t>Data</a:t>
-            </a:r>
-          </a:p>
-        </p:txBody>
-      </p:sp>
-      <p:sp>
-        <p:nvSpPr>
-          <p:cNvPr id="7" name="Title 1">
-            <a:extLst>
-              <a:ext uri="{FF2B5EF4-FFF2-40B4-BE49-F238E27FC236}">
-                <a16:creationId xmlns:a16="http://schemas.microsoft.com/office/drawing/2014/main" id="{10423729-3044-445D-871B-0ADC571E4640}"/>
+              <a:t>Mathematical Model</a:t>
+            </a:r>
+          </a:p>
+        </p:txBody>
+      </p:sp>
+      <p:cxnSp>
+        <p:nvCxnSpPr>
+          <p:cNvPr id="30" name="Straight Arrow Connector 29">
+            <a:extLst>
+              <a:ext uri="{FF2B5EF4-FFF2-40B4-BE49-F238E27FC236}">
+                <a16:creationId xmlns:a16="http://schemas.microsoft.com/office/drawing/2014/main" id="{ECC8D4D9-BCE2-49D6-90C4-616AD81984F4}"/>
+              </a:ext>
+            </a:extLst>
+          </p:cNvPr>
+          <p:cNvCxnSpPr>
+            <a:cxnSpLocks/>
+          </p:cNvCxnSpPr>
+          <p:nvPr/>
+        </p:nvCxnSpPr>
+        <p:spPr>
+          <a:xfrm>
+            <a:off x="6227618" y="3430028"/>
+            <a:ext cx="456348" cy="0"/>
+          </a:xfrm>
+          <a:prstGeom prst="straightConnector1">
+            <a:avLst/>
+          </a:prstGeom>
+          <a:ln>
+            <a:tailEnd type="triangle"/>
+          </a:ln>
+        </p:spPr>
+        <p:style>
+          <a:lnRef idx="1">
+            <a:schemeClr val="accent1"/>
+          </a:lnRef>
+          <a:fillRef idx="0">
+            <a:schemeClr val="accent1"/>
+          </a:fillRef>
+          <a:effectRef idx="0">
+            <a:schemeClr val="accent1"/>
+          </a:effectRef>
+          <a:fontRef idx="minor">
+            <a:schemeClr val="tx1"/>
+          </a:fontRef>
+        </p:style>
+      </p:cxnSp>
+      <p:cxnSp>
+        <p:nvCxnSpPr>
+          <p:cNvPr id="56" name="Straight Arrow Connector 55">
+            <a:extLst>
+              <a:ext uri="{FF2B5EF4-FFF2-40B4-BE49-F238E27FC236}">
+                <a16:creationId xmlns:a16="http://schemas.microsoft.com/office/drawing/2014/main" id="{ABFF7445-C26E-48AE-831C-5C97DF6EBAD5}"/>
+              </a:ext>
+            </a:extLst>
+          </p:cNvPr>
+          <p:cNvCxnSpPr>
+            <a:cxnSpLocks/>
+          </p:cNvCxnSpPr>
+          <p:nvPr/>
+        </p:nvCxnSpPr>
+        <p:spPr>
+          <a:xfrm>
+            <a:off x="7806184" y="3431865"/>
+            <a:ext cx="776431" cy="0"/>
+          </a:xfrm>
+          <a:prstGeom prst="straightConnector1">
+            <a:avLst/>
+          </a:prstGeom>
+          <a:ln>
+            <a:tailEnd type="triangle"/>
+          </a:ln>
+        </p:spPr>
+        <p:style>
+          <a:lnRef idx="1">
+            <a:schemeClr val="accent1"/>
+          </a:lnRef>
+          <a:fillRef idx="0">
+            <a:schemeClr val="accent1"/>
+          </a:fillRef>
+          <a:effectRef idx="0">
+            <a:schemeClr val="accent1"/>
+          </a:effectRef>
+          <a:fontRef idx="minor">
+            <a:schemeClr val="tx1"/>
+          </a:fontRef>
+        </p:style>
+      </p:cxnSp>
+      <p:sp>
+        <p:nvSpPr>
+          <p:cNvPr id="57" name="Title 1">
+            <a:extLst>
+              <a:ext uri="{FF2B5EF4-FFF2-40B4-BE49-F238E27FC236}">
+                <a16:creationId xmlns:a16="http://schemas.microsoft.com/office/drawing/2014/main" id="{01A342A9-F893-4055-9C31-D086183E8748}"/>
               </a:ext>
             </a:extLst>
           </p:cNvPr>
@@ -4459,16 +4226,17 @@
         </p:nvSpPr>
         <p:spPr>
           <a:xfrm>
-            <a:off x="7988425" y="1591390"/>
-            <a:ext cx="1349552" cy="923495"/>
+            <a:off x="8582615" y="3105758"/>
+            <a:ext cx="1037665" cy="617081"/>
           </a:xfrm>
           <a:prstGeom prst="rect">
             <a:avLst/>
           </a:prstGeom>
           <a:ln>
             <a:solidFill>
-              <a:schemeClr val="accent1"/>
+              <a:srgbClr val="FF0000"/>
             </a:solidFill>
+            <a:prstDash val="solid"/>
           </a:ln>
         </p:spPr>
         <p:txBody>
@@ -4497,238 +4265,24 @@
           <a:p>
             <a:r>
               <a:rPr lang="en-US" sz="2000" dirty="0"/>
-              <a:t>Calibration of Solution Space</a:t>
-            </a:r>
-          </a:p>
-        </p:txBody>
-      </p:sp>
-      <p:sp>
-        <p:nvSpPr>
-          <p:cNvPr id="9" name="Arc 8">
-            <a:extLst>
-              <a:ext uri="{FF2B5EF4-FFF2-40B4-BE49-F238E27FC236}">
-                <a16:creationId xmlns:a16="http://schemas.microsoft.com/office/drawing/2014/main" id="{6279D37A-656D-4BC9-9F60-8B408775A96E}"/>
-              </a:ext>
-            </a:extLst>
-          </p:cNvPr>
-          <p:cNvSpPr/>
-          <p:nvPr/>
-        </p:nvSpPr>
-        <p:spPr>
-          <a:xfrm rot="16500168">
-            <a:off x="6387261" y="994322"/>
-            <a:ext cx="2372173" cy="4124044"/>
-          </a:xfrm>
-          <a:prstGeom prst="arc">
-            <a:avLst>
-              <a:gd name="adj1" fmla="val 16074121"/>
-              <a:gd name="adj2" fmla="val 0"/>
-            </a:avLst>
-          </a:prstGeom>
-          <a:ln>
-            <a:headEnd type="triangle" w="med" len="med"/>
-            <a:tailEnd type="none" w="med" len="med"/>
-          </a:ln>
-        </p:spPr>
-        <p:style>
-          <a:lnRef idx="1">
-            <a:schemeClr val="accent1"/>
-          </a:lnRef>
-          <a:fillRef idx="0">
-            <a:schemeClr val="accent1"/>
-          </a:fillRef>
-          <a:effectRef idx="0">
-            <a:schemeClr val="accent1"/>
-          </a:effectRef>
-          <a:fontRef idx="minor">
-            <a:schemeClr val="tx1"/>
-          </a:fontRef>
-        </p:style>
-        <p:txBody>
-          <a:bodyPr rtlCol="0" anchor="ctr"/>
-          <a:lstStyle/>
-          <a:p>
-            <a:pPr algn="ctr"/>
-            <a:endParaRPr lang="en-US"/>
-          </a:p>
-        </p:txBody>
-      </p:sp>
-      <p:cxnSp>
-        <p:nvCxnSpPr>
-          <p:cNvPr id="11" name="Straight Arrow Connector 10">
-            <a:extLst>
-              <a:ext uri="{FF2B5EF4-FFF2-40B4-BE49-F238E27FC236}">
-                <a16:creationId xmlns:a16="http://schemas.microsoft.com/office/drawing/2014/main" id="{8D238BF1-E17A-41D9-8252-7EFDB8329FDC}"/>
-              </a:ext>
-            </a:extLst>
-          </p:cNvPr>
-          <p:cNvCxnSpPr>
-            <a:cxnSpLocks/>
-            <a:stCxn id="2" idx="3"/>
-            <a:endCxn id="4" idx="1"/>
-          </p:cNvCxnSpPr>
-          <p:nvPr/>
-        </p:nvCxnSpPr>
-        <p:spPr>
-          <a:xfrm>
-            <a:off x="2091855" y="3431791"/>
-            <a:ext cx="668770" cy="322"/>
-          </a:xfrm>
-          <a:prstGeom prst="straightConnector1">
-            <a:avLst/>
-          </a:prstGeom>
-          <a:ln>
-            <a:tailEnd type="triangle"/>
-          </a:ln>
-        </p:spPr>
-        <p:style>
-          <a:lnRef idx="1">
-            <a:schemeClr val="accent1"/>
-          </a:lnRef>
-          <a:fillRef idx="0">
-            <a:schemeClr val="accent1"/>
-          </a:fillRef>
-          <a:effectRef idx="0">
-            <a:schemeClr val="accent1"/>
-          </a:effectRef>
-          <a:fontRef idx="minor">
-            <a:schemeClr val="tx1"/>
-          </a:fontRef>
-        </p:style>
-      </p:cxnSp>
-      <p:cxnSp>
-        <p:nvCxnSpPr>
-          <p:cNvPr id="12" name="Straight Arrow Connector 11">
-            <a:extLst>
-              <a:ext uri="{FF2B5EF4-FFF2-40B4-BE49-F238E27FC236}">
-                <a16:creationId xmlns:a16="http://schemas.microsoft.com/office/drawing/2014/main" id="{C4C90F58-5BC9-4B18-85C6-B6CEBB4DE611}"/>
-              </a:ext>
-            </a:extLst>
-          </p:cNvPr>
-          <p:cNvCxnSpPr>
-            <a:cxnSpLocks/>
-            <a:stCxn id="4" idx="3"/>
-          </p:cNvCxnSpPr>
-          <p:nvPr/>
-        </p:nvCxnSpPr>
-        <p:spPr>
-          <a:xfrm>
-            <a:off x="4171206" y="3432113"/>
-            <a:ext cx="456348" cy="0"/>
-          </a:xfrm>
-          <a:prstGeom prst="straightConnector1">
-            <a:avLst/>
-          </a:prstGeom>
-          <a:ln>
-            <a:tailEnd type="triangle"/>
-          </a:ln>
-        </p:spPr>
-        <p:style>
-          <a:lnRef idx="1">
-            <a:schemeClr val="accent1"/>
-          </a:lnRef>
-          <a:fillRef idx="0">
-            <a:schemeClr val="accent1"/>
-          </a:fillRef>
-          <a:effectRef idx="0">
-            <a:schemeClr val="accent1"/>
-          </a:effectRef>
-          <a:fontRef idx="minor">
-            <a:schemeClr val="tx1"/>
-          </a:fontRef>
-        </p:style>
-      </p:cxnSp>
-      <p:cxnSp>
-        <p:nvCxnSpPr>
-          <p:cNvPr id="14" name="Straight Arrow Connector 13">
-            <a:extLst>
-              <a:ext uri="{FF2B5EF4-FFF2-40B4-BE49-F238E27FC236}">
-                <a16:creationId xmlns:a16="http://schemas.microsoft.com/office/drawing/2014/main" id="{4814081F-EB5B-4158-AAB1-B5DDF349F985}"/>
-              </a:ext>
-            </a:extLst>
-          </p:cNvPr>
-          <p:cNvCxnSpPr>
-            <a:cxnSpLocks/>
-            <a:stCxn id="5" idx="0"/>
-            <a:endCxn id="6" idx="2"/>
-          </p:cNvCxnSpPr>
-          <p:nvPr/>
-        </p:nvCxnSpPr>
-        <p:spPr>
-          <a:xfrm flipH="1" flipV="1">
-            <a:off x="7245074" y="2773255"/>
-            <a:ext cx="1" cy="470352"/>
-          </a:xfrm>
-          <a:prstGeom prst="straightConnector1">
-            <a:avLst/>
-          </a:prstGeom>
-          <a:ln>
-            <a:headEnd type="triangle"/>
-            <a:tailEnd type="triangle"/>
-          </a:ln>
-        </p:spPr>
-        <p:style>
-          <a:lnRef idx="1">
-            <a:schemeClr val="accent1"/>
-          </a:lnRef>
-          <a:fillRef idx="0">
-            <a:schemeClr val="accent1"/>
-          </a:fillRef>
-          <a:effectRef idx="0">
-            <a:schemeClr val="accent1"/>
-          </a:effectRef>
-          <a:fontRef idx="minor">
-            <a:schemeClr val="tx1"/>
-          </a:fontRef>
-        </p:style>
-      </p:cxnSp>
-      <p:cxnSp>
-        <p:nvCxnSpPr>
-          <p:cNvPr id="20" name="Straight Arrow Connector 19">
-            <a:extLst>
-              <a:ext uri="{FF2B5EF4-FFF2-40B4-BE49-F238E27FC236}">
-                <a16:creationId xmlns:a16="http://schemas.microsoft.com/office/drawing/2014/main" id="{2995234C-CB5C-4729-A8BD-523AAA198592}"/>
-              </a:ext>
-            </a:extLst>
-          </p:cNvPr>
-          <p:cNvCxnSpPr>
-            <a:cxnSpLocks/>
-          </p:cNvCxnSpPr>
-          <p:nvPr/>
-        </p:nvCxnSpPr>
-        <p:spPr>
-          <a:xfrm>
-            <a:off x="7806184" y="3432113"/>
-            <a:ext cx="776431" cy="0"/>
-          </a:xfrm>
-          <a:prstGeom prst="straightConnector1">
-            <a:avLst/>
-          </a:prstGeom>
-          <a:ln>
-            <a:tailEnd type="triangle"/>
-          </a:ln>
-        </p:spPr>
-        <p:style>
-          <a:lnRef idx="1">
-            <a:schemeClr val="accent1"/>
-          </a:lnRef>
-          <a:fillRef idx="0">
-            <a:schemeClr val="accent1"/>
-          </a:fillRef>
-          <a:effectRef idx="0">
-            <a:schemeClr val="accent1"/>
-          </a:effectRef>
-          <a:fontRef idx="minor">
-            <a:schemeClr val="tx1"/>
-          </a:fontRef>
-        </p:style>
-      </p:cxnSp>
-      <p:sp>
-        <p:nvSpPr>
-          <p:cNvPr id="21" name="Title 1">
-            <a:extLst>
-              <a:ext uri="{FF2B5EF4-FFF2-40B4-BE49-F238E27FC236}">
-                <a16:creationId xmlns:a16="http://schemas.microsoft.com/office/drawing/2014/main" id="{83C15328-A1DC-4BBE-920E-703A6FCA2182}"/>
+              <a:t>Future</a:t>
+            </a:r>
+            <a:br>
+              <a:rPr lang="en-US" sz="2000" dirty="0"/>
+            </a:br>
+            <a:r>
+              <a:rPr lang="en-US" sz="2000" dirty="0"/>
+              <a:t>Reality</a:t>
+            </a:r>
+          </a:p>
+        </p:txBody>
+      </p:sp>
+      <p:sp>
+        <p:nvSpPr>
+          <p:cNvPr id="13" name="Title 1">
+            <a:extLst>
+              <a:ext uri="{FF2B5EF4-FFF2-40B4-BE49-F238E27FC236}">
+                <a16:creationId xmlns:a16="http://schemas.microsoft.com/office/drawing/2014/main" id="{87AB2584-89A6-4779-938C-F1FA006D718D}"/>
               </a:ext>
             </a:extLst>
           </p:cNvPr>
@@ -4739,17 +4293,207 @@
         </p:nvSpPr>
         <p:spPr>
           <a:xfrm>
-            <a:off x="8582615" y="3105758"/>
+            <a:off x="386938" y="220701"/>
+            <a:ext cx="11418124" cy="617081"/>
+          </a:xfrm>
+          <a:prstGeom prst="rect">
+            <a:avLst/>
+          </a:prstGeom>
+          <a:ln>
+            <a:noFill/>
+          </a:ln>
+        </p:spPr>
+        <p:txBody>
+          <a:bodyPr vert="horz" lIns="91440" tIns="45720" rIns="91440" bIns="45720" rtlCol="0" anchor="ctr">
+            <a:noAutofit/>
+          </a:bodyPr>
+          <a:lstStyle>
+            <a:lvl1pPr algn="ctr" defTabSz="914400" rtl="0" eaLnBrk="1" latinLnBrk="0" hangingPunct="1">
+              <a:lnSpc>
+                <a:spcPct val="90000"/>
+              </a:lnSpc>
+              <a:spcBef>
+                <a:spcPct val="0"/>
+              </a:spcBef>
+              <a:buNone/>
+              <a:defRPr sz="6000" kern="1200">
+                <a:solidFill>
+                  <a:schemeClr val="tx1"/>
+                </a:solidFill>
+                <a:latin typeface="+mj-lt"/>
+                <a:ea typeface="+mj-ea"/>
+                <a:cs typeface="+mj-cs"/>
+              </a:defRPr>
+            </a:lvl1pPr>
+          </a:lstStyle>
+          <a:p>
+            <a:r>
+              <a:rPr lang="en-US" sz="3200" dirty="0"/>
+              <a:t>Hydrology for 100.  What Is A Model?</a:t>
+            </a:r>
+          </a:p>
+        </p:txBody>
+      </p:sp>
+      <p:sp>
+        <p:nvSpPr>
+          <p:cNvPr id="14" name="Title 1">
+            <a:extLst>
+              <a:ext uri="{FF2B5EF4-FFF2-40B4-BE49-F238E27FC236}">
+                <a16:creationId xmlns:a16="http://schemas.microsoft.com/office/drawing/2014/main" id="{00E5773F-1C41-4CCB-892F-7B8EAF57F3E3}"/>
+              </a:ext>
+            </a:extLst>
+          </p:cNvPr>
+          <p:cNvSpPr txBox="1">
+            <a:spLocks/>
+          </p:cNvSpPr>
+          <p:nvPr/>
+        </p:nvSpPr>
+        <p:spPr>
+          <a:xfrm>
+            <a:off x="829916" y="6299355"/>
+            <a:ext cx="10532168" cy="376518"/>
+          </a:xfrm>
+          <a:prstGeom prst="rect">
+            <a:avLst/>
+          </a:prstGeom>
+          <a:ln>
+            <a:noFill/>
+          </a:ln>
+        </p:spPr>
+        <p:txBody>
+          <a:bodyPr vert="horz" lIns="91440" tIns="45720" rIns="91440" bIns="45720" rtlCol="0" anchor="ctr">
+            <a:noAutofit/>
+          </a:bodyPr>
+          <a:lstStyle>
+            <a:lvl1pPr algn="ctr" defTabSz="914400" rtl="0" eaLnBrk="1" latinLnBrk="0" hangingPunct="1">
+              <a:lnSpc>
+                <a:spcPct val="90000"/>
+              </a:lnSpc>
+              <a:spcBef>
+                <a:spcPct val="0"/>
+              </a:spcBef>
+              <a:buNone/>
+              <a:defRPr sz="6000" kern="1200">
+                <a:solidFill>
+                  <a:schemeClr val="tx1"/>
+                </a:solidFill>
+                <a:latin typeface="+mj-lt"/>
+                <a:ea typeface="+mj-ea"/>
+                <a:cs typeface="+mj-cs"/>
+              </a:defRPr>
+            </a:lvl1pPr>
+          </a:lstStyle>
+          <a:p>
+            <a:r>
+              <a:rPr lang="en-US" sz="1600" dirty="0"/>
+              <a:t>* The choice of which forecasts are important should inform model construction. </a:t>
+            </a:r>
+          </a:p>
+        </p:txBody>
+      </p:sp>
+    </p:spTree>
+    <p:extLst>
+      <p:ext uri="{BB962C8B-B14F-4D97-AF65-F5344CB8AC3E}">
+        <p14:creationId xmlns:p14="http://schemas.microsoft.com/office/powerpoint/2010/main" val="2249100097"/>
+      </p:ext>
+    </p:extLst>
+  </p:cSld>
+  <p:clrMapOvr>
+    <a:masterClrMapping/>
+  </p:clrMapOvr>
+</p:sld>
+</file>
+
+<file path=ppt/slides/slide5.xml><?xml version="1.0" encoding="utf-8"?>
+<p:sld xmlns:a="http://schemas.openxmlformats.org/drawingml/2006/main" xmlns:r="http://schemas.openxmlformats.org/officeDocument/2006/relationships" xmlns:p="http://schemas.openxmlformats.org/presentationml/2006/main">
+  <p:cSld>
+    <p:spTree>
+      <p:nvGrpSpPr>
+        <p:cNvPr id="1" name=""/>
+        <p:cNvGrpSpPr/>
+        <p:nvPr/>
+      </p:nvGrpSpPr>
+      <p:grpSpPr>
+        <a:xfrm>
+          <a:off x="0" y="0"/>
+          <a:ext cx="0" cy="0"/>
+          <a:chOff x="0" y="0"/>
+          <a:chExt cx="0" cy="0"/>
+        </a:xfrm>
+      </p:grpSpPr>
+      <p:sp>
+        <p:nvSpPr>
+          <p:cNvPr id="2" name="Title 1">
+            <a:extLst>
+              <a:ext uri="{FF2B5EF4-FFF2-40B4-BE49-F238E27FC236}">
+                <a16:creationId xmlns:a16="http://schemas.microsoft.com/office/drawing/2014/main" id="{BE79841B-49DF-4DD4-B002-2AEA8601D73C}"/>
+              </a:ext>
+            </a:extLst>
+          </p:cNvPr>
+          <p:cNvSpPr>
+            <a:spLocks noGrp="1"/>
+          </p:cNvSpPr>
+          <p:nvPr>
+            <p:ph type="ctrTitle"/>
+          </p:nvPr>
+        </p:nvSpPr>
+        <p:spPr>
+          <a:xfrm>
+            <a:off x="1054190" y="3123250"/>
             <a:ext cx="1037665" cy="617081"/>
+          </a:xfrm>
+          <a:ln>
+            <a:solidFill>
+              <a:schemeClr val="accent1"/>
+            </a:solidFill>
+          </a:ln>
+        </p:spPr>
+        <p:txBody>
+          <a:bodyPr>
+            <a:noAutofit/>
+          </a:bodyPr>
+          <a:lstStyle/>
+          <a:p>
+            <a:r>
+              <a:rPr lang="en-US" sz="2000" dirty="0"/>
+              <a:t>Current</a:t>
+            </a:r>
+            <a:br>
+              <a:rPr lang="en-US" sz="2000" dirty="0"/>
+            </a:br>
+            <a:r>
+              <a:rPr lang="en-US" sz="2000" dirty="0"/>
+              <a:t>Reality</a:t>
+            </a:r>
+          </a:p>
+        </p:txBody>
+      </p:sp>
+      <p:sp>
+        <p:nvSpPr>
+          <p:cNvPr id="4" name="Title 1">
+            <a:extLst>
+              <a:ext uri="{FF2B5EF4-FFF2-40B4-BE49-F238E27FC236}">
+                <a16:creationId xmlns:a16="http://schemas.microsoft.com/office/drawing/2014/main" id="{16D37473-2237-4246-976A-05F0CF693631}"/>
+              </a:ext>
+            </a:extLst>
+          </p:cNvPr>
+          <p:cNvSpPr txBox="1">
+            <a:spLocks/>
+          </p:cNvSpPr>
+          <p:nvPr/>
+        </p:nvSpPr>
+        <p:spPr>
+          <a:xfrm>
+            <a:off x="2760625" y="3123572"/>
+            <a:ext cx="1410581" cy="617081"/>
           </a:xfrm>
           <a:prstGeom prst="rect">
             <a:avLst/>
           </a:prstGeom>
           <a:ln>
             <a:solidFill>
-              <a:srgbClr val="FF0000"/>
+              <a:schemeClr val="accent1"/>
             </a:solidFill>
-            <a:prstDash val="solid"/>
           </a:ln>
         </p:spPr>
         <p:txBody>
@@ -4778,24 +4522,17 @@
           <a:p>
             <a:r>
               <a:rPr lang="en-US" sz="2000" dirty="0"/>
-              <a:t>Future</a:t>
-            </a:r>
-            <a:br>
-              <a:rPr lang="en-US" sz="2000" dirty="0"/>
-            </a:br>
-            <a:r>
-              <a:rPr lang="en-US" sz="2000" dirty="0"/>
-              <a:t>Reality</a:t>
-            </a:r>
-          </a:p>
-        </p:txBody>
-      </p:sp>
-      <p:sp>
-        <p:nvSpPr>
-          <p:cNvPr id="29" name="Title 1">
-            <a:extLst>
-              <a:ext uri="{FF2B5EF4-FFF2-40B4-BE49-F238E27FC236}">
-                <a16:creationId xmlns:a16="http://schemas.microsoft.com/office/drawing/2014/main" id="{628B551D-EE43-47E4-B353-FE7BA28483D9}"/>
+              <a:t>Conceptual Model</a:t>
+            </a:r>
+          </a:p>
+        </p:txBody>
+      </p:sp>
+      <p:sp>
+        <p:nvSpPr>
+          <p:cNvPr id="5" name="Title 1">
+            <a:extLst>
+              <a:ext uri="{FF2B5EF4-FFF2-40B4-BE49-F238E27FC236}">
+                <a16:creationId xmlns:a16="http://schemas.microsoft.com/office/drawing/2014/main" id="{30E6FA00-C89E-433B-9D90-AFBA12D18074}"/>
               </a:ext>
             </a:extLst>
           </p:cNvPr>
@@ -4806,8 +4543,8 @@
         </p:nvSpPr>
         <p:spPr>
           <a:xfrm>
-            <a:off x="4621629" y="3117387"/>
-            <a:ext cx="1605989" cy="617081"/>
+            <a:off x="6683965" y="3243607"/>
+            <a:ext cx="1122219" cy="376518"/>
           </a:xfrm>
           <a:prstGeom prst="rect">
             <a:avLst/>
@@ -4844,6 +4581,471 @@
           <a:p>
             <a:r>
               <a:rPr lang="en-US" sz="2000" dirty="0"/>
+              <a:t>Forecast</a:t>
+            </a:r>
+          </a:p>
+        </p:txBody>
+      </p:sp>
+      <p:sp>
+        <p:nvSpPr>
+          <p:cNvPr id="6" name="Title 1">
+            <a:extLst>
+              <a:ext uri="{FF2B5EF4-FFF2-40B4-BE49-F238E27FC236}">
+                <a16:creationId xmlns:a16="http://schemas.microsoft.com/office/drawing/2014/main" id="{514515F5-5A38-48E9-8C54-F7AF5FF40C54}"/>
+              </a:ext>
+            </a:extLst>
+          </p:cNvPr>
+          <p:cNvSpPr txBox="1">
+            <a:spLocks/>
+          </p:cNvSpPr>
+          <p:nvPr/>
+        </p:nvSpPr>
+        <p:spPr>
+          <a:xfrm>
+            <a:off x="6726241" y="2396737"/>
+            <a:ext cx="1037665" cy="376518"/>
+          </a:xfrm>
+          <a:prstGeom prst="rect">
+            <a:avLst/>
+          </a:prstGeom>
+          <a:ln>
+            <a:solidFill>
+              <a:schemeClr val="accent1"/>
+            </a:solidFill>
+          </a:ln>
+        </p:spPr>
+        <p:txBody>
+          <a:bodyPr vert="horz" lIns="91440" tIns="45720" rIns="91440" bIns="45720" rtlCol="0" anchor="b">
+            <a:noAutofit/>
+          </a:bodyPr>
+          <a:lstStyle>
+            <a:lvl1pPr algn="ctr" defTabSz="914400" rtl="0" eaLnBrk="1" latinLnBrk="0" hangingPunct="1">
+              <a:lnSpc>
+                <a:spcPct val="90000"/>
+              </a:lnSpc>
+              <a:spcBef>
+                <a:spcPct val="0"/>
+              </a:spcBef>
+              <a:buNone/>
+              <a:defRPr sz="6000" kern="1200">
+                <a:solidFill>
+                  <a:schemeClr val="tx1"/>
+                </a:solidFill>
+                <a:latin typeface="+mj-lt"/>
+                <a:ea typeface="+mj-ea"/>
+                <a:cs typeface="+mj-cs"/>
+              </a:defRPr>
+            </a:lvl1pPr>
+          </a:lstStyle>
+          <a:p>
+            <a:r>
+              <a:rPr lang="en-US" sz="2000" dirty="0"/>
+              <a:t>Data</a:t>
+            </a:r>
+          </a:p>
+        </p:txBody>
+      </p:sp>
+      <p:sp>
+        <p:nvSpPr>
+          <p:cNvPr id="7" name="Title 1">
+            <a:extLst>
+              <a:ext uri="{FF2B5EF4-FFF2-40B4-BE49-F238E27FC236}">
+                <a16:creationId xmlns:a16="http://schemas.microsoft.com/office/drawing/2014/main" id="{10423729-3044-445D-871B-0ADC571E4640}"/>
+              </a:ext>
+            </a:extLst>
+          </p:cNvPr>
+          <p:cNvSpPr txBox="1">
+            <a:spLocks/>
+          </p:cNvSpPr>
+          <p:nvPr/>
+        </p:nvSpPr>
+        <p:spPr>
+          <a:xfrm>
+            <a:off x="7988425" y="1591390"/>
+            <a:ext cx="1349552" cy="923495"/>
+          </a:xfrm>
+          <a:prstGeom prst="rect">
+            <a:avLst/>
+          </a:prstGeom>
+          <a:ln>
+            <a:solidFill>
+              <a:schemeClr val="accent1"/>
+            </a:solidFill>
+          </a:ln>
+        </p:spPr>
+        <p:txBody>
+          <a:bodyPr vert="horz" lIns="91440" tIns="45720" rIns="91440" bIns="45720" rtlCol="0" anchor="b">
+            <a:noAutofit/>
+          </a:bodyPr>
+          <a:lstStyle>
+            <a:lvl1pPr algn="ctr" defTabSz="914400" rtl="0" eaLnBrk="1" latinLnBrk="0" hangingPunct="1">
+              <a:lnSpc>
+                <a:spcPct val="90000"/>
+              </a:lnSpc>
+              <a:spcBef>
+                <a:spcPct val="0"/>
+              </a:spcBef>
+              <a:buNone/>
+              <a:defRPr sz="6000" kern="1200">
+                <a:solidFill>
+                  <a:schemeClr val="tx1"/>
+                </a:solidFill>
+                <a:latin typeface="+mj-lt"/>
+                <a:ea typeface="+mj-ea"/>
+                <a:cs typeface="+mj-cs"/>
+              </a:defRPr>
+            </a:lvl1pPr>
+          </a:lstStyle>
+          <a:p>
+            <a:r>
+              <a:rPr lang="en-US" sz="2000" dirty="0"/>
+              <a:t>Calibration of Solution Space</a:t>
+            </a:r>
+          </a:p>
+        </p:txBody>
+      </p:sp>
+      <p:sp>
+        <p:nvSpPr>
+          <p:cNvPr id="9" name="Arc 8">
+            <a:extLst>
+              <a:ext uri="{FF2B5EF4-FFF2-40B4-BE49-F238E27FC236}">
+                <a16:creationId xmlns:a16="http://schemas.microsoft.com/office/drawing/2014/main" id="{6279D37A-656D-4BC9-9F60-8B408775A96E}"/>
+              </a:ext>
+            </a:extLst>
+          </p:cNvPr>
+          <p:cNvSpPr/>
+          <p:nvPr/>
+        </p:nvSpPr>
+        <p:spPr>
+          <a:xfrm rot="16500168">
+            <a:off x="6387261" y="994322"/>
+            <a:ext cx="2372173" cy="4124044"/>
+          </a:xfrm>
+          <a:prstGeom prst="arc">
+            <a:avLst>
+              <a:gd name="adj1" fmla="val 16074121"/>
+              <a:gd name="adj2" fmla="val 0"/>
+            </a:avLst>
+          </a:prstGeom>
+          <a:ln>
+            <a:headEnd type="triangle" w="med" len="med"/>
+            <a:tailEnd type="none" w="med" len="med"/>
+          </a:ln>
+        </p:spPr>
+        <p:style>
+          <a:lnRef idx="1">
+            <a:schemeClr val="accent1"/>
+          </a:lnRef>
+          <a:fillRef idx="0">
+            <a:schemeClr val="accent1"/>
+          </a:fillRef>
+          <a:effectRef idx="0">
+            <a:schemeClr val="accent1"/>
+          </a:effectRef>
+          <a:fontRef idx="minor">
+            <a:schemeClr val="tx1"/>
+          </a:fontRef>
+        </p:style>
+        <p:txBody>
+          <a:bodyPr rtlCol="0" anchor="ctr"/>
+          <a:lstStyle/>
+          <a:p>
+            <a:pPr algn="ctr"/>
+            <a:endParaRPr lang="en-US"/>
+          </a:p>
+        </p:txBody>
+      </p:sp>
+      <p:cxnSp>
+        <p:nvCxnSpPr>
+          <p:cNvPr id="11" name="Straight Arrow Connector 10">
+            <a:extLst>
+              <a:ext uri="{FF2B5EF4-FFF2-40B4-BE49-F238E27FC236}">
+                <a16:creationId xmlns:a16="http://schemas.microsoft.com/office/drawing/2014/main" id="{8D238BF1-E17A-41D9-8252-7EFDB8329FDC}"/>
+              </a:ext>
+            </a:extLst>
+          </p:cNvPr>
+          <p:cNvCxnSpPr>
+            <a:cxnSpLocks/>
+            <a:stCxn id="2" idx="3"/>
+            <a:endCxn id="4" idx="1"/>
+          </p:cNvCxnSpPr>
+          <p:nvPr/>
+        </p:nvCxnSpPr>
+        <p:spPr>
+          <a:xfrm>
+            <a:off x="2091855" y="3431791"/>
+            <a:ext cx="668770" cy="322"/>
+          </a:xfrm>
+          <a:prstGeom prst="straightConnector1">
+            <a:avLst/>
+          </a:prstGeom>
+          <a:ln>
+            <a:tailEnd type="triangle"/>
+          </a:ln>
+        </p:spPr>
+        <p:style>
+          <a:lnRef idx="1">
+            <a:schemeClr val="accent1"/>
+          </a:lnRef>
+          <a:fillRef idx="0">
+            <a:schemeClr val="accent1"/>
+          </a:fillRef>
+          <a:effectRef idx="0">
+            <a:schemeClr val="accent1"/>
+          </a:effectRef>
+          <a:fontRef idx="minor">
+            <a:schemeClr val="tx1"/>
+          </a:fontRef>
+        </p:style>
+      </p:cxnSp>
+      <p:cxnSp>
+        <p:nvCxnSpPr>
+          <p:cNvPr id="12" name="Straight Arrow Connector 11">
+            <a:extLst>
+              <a:ext uri="{FF2B5EF4-FFF2-40B4-BE49-F238E27FC236}">
+                <a16:creationId xmlns:a16="http://schemas.microsoft.com/office/drawing/2014/main" id="{C4C90F58-5BC9-4B18-85C6-B6CEBB4DE611}"/>
+              </a:ext>
+            </a:extLst>
+          </p:cNvPr>
+          <p:cNvCxnSpPr>
+            <a:cxnSpLocks/>
+            <a:stCxn id="4" idx="3"/>
+          </p:cNvCxnSpPr>
+          <p:nvPr/>
+        </p:nvCxnSpPr>
+        <p:spPr>
+          <a:xfrm>
+            <a:off x="4171206" y="3432113"/>
+            <a:ext cx="456348" cy="0"/>
+          </a:xfrm>
+          <a:prstGeom prst="straightConnector1">
+            <a:avLst/>
+          </a:prstGeom>
+          <a:ln>
+            <a:tailEnd type="triangle"/>
+          </a:ln>
+        </p:spPr>
+        <p:style>
+          <a:lnRef idx="1">
+            <a:schemeClr val="accent1"/>
+          </a:lnRef>
+          <a:fillRef idx="0">
+            <a:schemeClr val="accent1"/>
+          </a:fillRef>
+          <a:effectRef idx="0">
+            <a:schemeClr val="accent1"/>
+          </a:effectRef>
+          <a:fontRef idx="minor">
+            <a:schemeClr val="tx1"/>
+          </a:fontRef>
+        </p:style>
+      </p:cxnSp>
+      <p:cxnSp>
+        <p:nvCxnSpPr>
+          <p:cNvPr id="14" name="Straight Arrow Connector 13">
+            <a:extLst>
+              <a:ext uri="{FF2B5EF4-FFF2-40B4-BE49-F238E27FC236}">
+                <a16:creationId xmlns:a16="http://schemas.microsoft.com/office/drawing/2014/main" id="{4814081F-EB5B-4158-AAB1-B5DDF349F985}"/>
+              </a:ext>
+            </a:extLst>
+          </p:cNvPr>
+          <p:cNvCxnSpPr>
+            <a:cxnSpLocks/>
+            <a:stCxn id="5" idx="0"/>
+            <a:endCxn id="6" idx="2"/>
+          </p:cNvCxnSpPr>
+          <p:nvPr/>
+        </p:nvCxnSpPr>
+        <p:spPr>
+          <a:xfrm flipH="1" flipV="1">
+            <a:off x="7245074" y="2773255"/>
+            <a:ext cx="1" cy="470352"/>
+          </a:xfrm>
+          <a:prstGeom prst="straightConnector1">
+            <a:avLst/>
+          </a:prstGeom>
+          <a:ln>
+            <a:headEnd type="triangle"/>
+            <a:tailEnd type="triangle"/>
+          </a:ln>
+        </p:spPr>
+        <p:style>
+          <a:lnRef idx="1">
+            <a:schemeClr val="accent1"/>
+          </a:lnRef>
+          <a:fillRef idx="0">
+            <a:schemeClr val="accent1"/>
+          </a:fillRef>
+          <a:effectRef idx="0">
+            <a:schemeClr val="accent1"/>
+          </a:effectRef>
+          <a:fontRef idx="minor">
+            <a:schemeClr val="tx1"/>
+          </a:fontRef>
+        </p:style>
+      </p:cxnSp>
+      <p:cxnSp>
+        <p:nvCxnSpPr>
+          <p:cNvPr id="20" name="Straight Arrow Connector 19">
+            <a:extLst>
+              <a:ext uri="{FF2B5EF4-FFF2-40B4-BE49-F238E27FC236}">
+                <a16:creationId xmlns:a16="http://schemas.microsoft.com/office/drawing/2014/main" id="{2995234C-CB5C-4729-A8BD-523AAA198592}"/>
+              </a:ext>
+            </a:extLst>
+          </p:cNvPr>
+          <p:cNvCxnSpPr>
+            <a:cxnSpLocks/>
+          </p:cNvCxnSpPr>
+          <p:nvPr/>
+        </p:nvCxnSpPr>
+        <p:spPr>
+          <a:xfrm>
+            <a:off x="7806184" y="3432113"/>
+            <a:ext cx="776431" cy="0"/>
+          </a:xfrm>
+          <a:prstGeom prst="straightConnector1">
+            <a:avLst/>
+          </a:prstGeom>
+          <a:ln>
+            <a:tailEnd type="triangle"/>
+          </a:ln>
+        </p:spPr>
+        <p:style>
+          <a:lnRef idx="1">
+            <a:schemeClr val="accent1"/>
+          </a:lnRef>
+          <a:fillRef idx="0">
+            <a:schemeClr val="accent1"/>
+          </a:fillRef>
+          <a:effectRef idx="0">
+            <a:schemeClr val="accent1"/>
+          </a:effectRef>
+          <a:fontRef idx="minor">
+            <a:schemeClr val="tx1"/>
+          </a:fontRef>
+        </p:style>
+      </p:cxnSp>
+      <p:sp>
+        <p:nvSpPr>
+          <p:cNvPr id="21" name="Title 1">
+            <a:extLst>
+              <a:ext uri="{FF2B5EF4-FFF2-40B4-BE49-F238E27FC236}">
+                <a16:creationId xmlns:a16="http://schemas.microsoft.com/office/drawing/2014/main" id="{83C15328-A1DC-4BBE-920E-703A6FCA2182}"/>
+              </a:ext>
+            </a:extLst>
+          </p:cNvPr>
+          <p:cNvSpPr txBox="1">
+            <a:spLocks/>
+          </p:cNvSpPr>
+          <p:nvPr/>
+        </p:nvSpPr>
+        <p:spPr>
+          <a:xfrm>
+            <a:off x="8582615" y="3105758"/>
+            <a:ext cx="1037665" cy="617081"/>
+          </a:xfrm>
+          <a:prstGeom prst="rect">
+            <a:avLst/>
+          </a:prstGeom>
+          <a:ln>
+            <a:solidFill>
+              <a:srgbClr val="FF0000"/>
+            </a:solidFill>
+            <a:prstDash val="solid"/>
+          </a:ln>
+        </p:spPr>
+        <p:txBody>
+          <a:bodyPr vert="horz" lIns="91440" tIns="45720" rIns="91440" bIns="45720" rtlCol="0" anchor="b">
+            <a:noAutofit/>
+          </a:bodyPr>
+          <a:lstStyle>
+            <a:lvl1pPr algn="ctr" defTabSz="914400" rtl="0" eaLnBrk="1" latinLnBrk="0" hangingPunct="1">
+              <a:lnSpc>
+                <a:spcPct val="90000"/>
+              </a:lnSpc>
+              <a:spcBef>
+                <a:spcPct val="0"/>
+              </a:spcBef>
+              <a:buNone/>
+              <a:defRPr sz="6000" kern="1200">
+                <a:solidFill>
+                  <a:schemeClr val="tx1"/>
+                </a:solidFill>
+                <a:latin typeface="+mj-lt"/>
+                <a:ea typeface="+mj-ea"/>
+                <a:cs typeface="+mj-cs"/>
+              </a:defRPr>
+            </a:lvl1pPr>
+          </a:lstStyle>
+          <a:p>
+            <a:r>
+              <a:rPr lang="en-US" sz="2000" dirty="0"/>
+              <a:t>Future</a:t>
+            </a:r>
+            <a:br>
+              <a:rPr lang="en-US" sz="2000" dirty="0"/>
+            </a:br>
+            <a:r>
+              <a:rPr lang="en-US" sz="2000" dirty="0"/>
+              <a:t>Reality</a:t>
+            </a:r>
+          </a:p>
+        </p:txBody>
+      </p:sp>
+      <p:sp>
+        <p:nvSpPr>
+          <p:cNvPr id="29" name="Title 1">
+            <a:extLst>
+              <a:ext uri="{FF2B5EF4-FFF2-40B4-BE49-F238E27FC236}">
+                <a16:creationId xmlns:a16="http://schemas.microsoft.com/office/drawing/2014/main" id="{628B551D-EE43-47E4-B353-FE7BA28483D9}"/>
+              </a:ext>
+            </a:extLst>
+          </p:cNvPr>
+          <p:cNvSpPr txBox="1">
+            <a:spLocks/>
+          </p:cNvSpPr>
+          <p:nvPr/>
+        </p:nvSpPr>
+        <p:spPr>
+          <a:xfrm>
+            <a:off x="4621629" y="3117387"/>
+            <a:ext cx="1605989" cy="617081"/>
+          </a:xfrm>
+          <a:prstGeom prst="rect">
+            <a:avLst/>
+          </a:prstGeom>
+          <a:ln>
+            <a:solidFill>
+              <a:schemeClr val="accent1"/>
+            </a:solidFill>
+          </a:ln>
+        </p:spPr>
+        <p:txBody>
+          <a:bodyPr vert="horz" lIns="91440" tIns="45720" rIns="91440" bIns="45720" rtlCol="0" anchor="b">
+            <a:noAutofit/>
+          </a:bodyPr>
+          <a:lstStyle>
+            <a:lvl1pPr algn="ctr" defTabSz="914400" rtl="0" eaLnBrk="1" latinLnBrk="0" hangingPunct="1">
+              <a:lnSpc>
+                <a:spcPct val="90000"/>
+              </a:lnSpc>
+              <a:spcBef>
+                <a:spcPct val="0"/>
+              </a:spcBef>
+              <a:buNone/>
+              <a:defRPr sz="6000" kern="1200">
+                <a:solidFill>
+                  <a:schemeClr val="tx1"/>
+                </a:solidFill>
+                <a:latin typeface="+mj-lt"/>
+                <a:ea typeface="+mj-ea"/>
+                <a:cs typeface="+mj-cs"/>
+              </a:defRPr>
+            </a:lvl1pPr>
+          </a:lstStyle>
+          <a:p>
+            <a:r>
+              <a:rPr lang="en-US" sz="2000" dirty="0"/>
               <a:t>Mathematical Model</a:t>
             </a:r>
           </a:p>
@@ -4993,7 +5195,7 @@
           <a:p>
             <a:r>
               <a:rPr lang="en-US" sz="3200" dirty="0"/>
-              <a:t>Data … A Way to Ruin A Perfectly Good Model</a:t>
+              <a:t>Data … or, How to Ruin A Perfectly Good Model</a:t>
             </a:r>
           </a:p>
         </p:txBody>
@@ -5125,7 +5327,7 @@
 </p:sld>
 </file>
 
-<file path=ppt/slides/slide5.xml><?xml version="1.0" encoding="utf-8"?>
+<file path=ppt/slides/slide6.xml><?xml version="1.0" encoding="utf-8"?>
 <p:sld xmlns:a="http://schemas.openxmlformats.org/drawingml/2006/main" xmlns:r="http://schemas.openxmlformats.org/officeDocument/2006/relationships" xmlns:p="http://schemas.openxmlformats.org/presentationml/2006/main">
   <p:cSld>
     <p:spTree>
@@ -6875,7 +7077,15 @@
           <a:p>
             <a:r>
               <a:rPr lang="en-US" sz="1600" dirty="0"/>
-              <a:t>Parameters whose values can be changed without changing the fit of a model to the data form the ‘null space’.  Forecasts may be sensitivity to some of these parameters.  Therefore, by varying these parameters we can form multiple equally good-fitting (equally likely) models that make a range of forecasts.  This is the first level of forecast uncertainty estimation.</a:t>
+              <a:t>Parameters whose values can be changed without changing the fit of a model to the data form the ‘null space’.  Forecasts may be </a:t>
+            </a:r>
+            <a:r>
+              <a:rPr lang="en-US" sz="1600" dirty="0" err="1"/>
+              <a:t>sensitivite</a:t>
+            </a:r>
+            <a:r>
+              <a:rPr lang="en-US" sz="1600" dirty="0"/>
+              <a:t> to some of these parameters.  Therefore, by varying these parameters we can form multiple equally good-fitting (equally likely) models that make a range of forecasts.  This is the first level of forecast uncertainty estimation.</a:t>
             </a:r>
           </a:p>
         </p:txBody>
@@ -6893,7 +7103,7 @@
 </p:sld>
 </file>
 
-<file path=ppt/slides/slide6.xml><?xml version="1.0" encoding="utf-8"?>
+<file path=ppt/slides/slide7.xml><?xml version="1.0" encoding="utf-8"?>
 <p:sld xmlns:a="http://schemas.openxmlformats.org/drawingml/2006/main" xmlns:r="http://schemas.openxmlformats.org/officeDocument/2006/relationships" xmlns:p="http://schemas.openxmlformats.org/presentationml/2006/main">
   <p:cSld>
     <p:spTree>
@@ -9800,7 +10010,7 @@
 </p:sld>
 </file>
 
-<file path=ppt/slides/slide7.xml><?xml version="1.0" encoding="utf-8"?>
+<file path=ppt/slides/slide8.xml><?xml version="1.0" encoding="utf-8"?>
 <p:sld xmlns:a="http://schemas.openxmlformats.org/drawingml/2006/main" xmlns:r="http://schemas.openxmlformats.org/officeDocument/2006/relationships" xmlns:p="http://schemas.openxmlformats.org/presentationml/2006/main">
   <p:cSld>
     <p:spTree>

</xml_diff>